<commit_message>
comments en aanpassingen aan presentatie
</commit_message>
<xml_diff>
--- a/Presentatie chips and circuits.pptx
+++ b/Presentatie chips and circuits.pptx
@@ -9,9 +9,8 @@
     <p:sldId id="257" r:id="rId3"/>
     <p:sldId id="258" r:id="rId4"/>
     <p:sldId id="262" r:id="rId5"/>
-    <p:sldId id="259" r:id="rId6"/>
-    <p:sldId id="260" r:id="rId7"/>
-    <p:sldId id="261" r:id="rId8"/>
+    <p:sldId id="260" r:id="rId6"/>
+    <p:sldId id="261" r:id="rId7"/>
   </p:sldIdLst>
   <p:sldSz cx="9144000" cy="6858000" type="screen4x3"/>
   <p:notesSz cx="6858000" cy="9144000"/>
@@ -294,7 +293,7 @@
           <a:p>
             <a:fld id="{4671B44B-FB70-E747-B8B6-ADB8F11B392A}" type="datetimeFigureOut">
               <a:rPr lang="en-US" smtClean="0"/>
-              <a:t>11-11-14</a:t>
+              <a:t>17-11-14</a:t>
             </a:fld>
             <a:endParaRPr lang="en-US"/>
           </a:p>
@@ -464,7 +463,7 @@
           <a:p>
             <a:fld id="{4671B44B-FB70-E747-B8B6-ADB8F11B392A}" type="datetimeFigureOut">
               <a:rPr lang="en-US" smtClean="0"/>
-              <a:t>11-11-14</a:t>
+              <a:t>17-11-14</a:t>
             </a:fld>
             <a:endParaRPr lang="en-US"/>
           </a:p>
@@ -644,7 +643,7 @@
           <a:p>
             <a:fld id="{4671B44B-FB70-E747-B8B6-ADB8F11B392A}" type="datetimeFigureOut">
               <a:rPr lang="en-US" smtClean="0"/>
-              <a:t>11-11-14</a:t>
+              <a:t>17-11-14</a:t>
             </a:fld>
             <a:endParaRPr lang="en-US"/>
           </a:p>
@@ -814,7 +813,7 @@
           <a:p>
             <a:fld id="{4671B44B-FB70-E747-B8B6-ADB8F11B392A}" type="datetimeFigureOut">
               <a:rPr lang="en-US" smtClean="0"/>
-              <a:t>11-11-14</a:t>
+              <a:t>17-11-14</a:t>
             </a:fld>
             <a:endParaRPr lang="en-US"/>
           </a:p>
@@ -1060,7 +1059,7 @@
           <a:p>
             <a:fld id="{4671B44B-FB70-E747-B8B6-ADB8F11B392A}" type="datetimeFigureOut">
               <a:rPr lang="en-US" smtClean="0"/>
-              <a:t>11-11-14</a:t>
+              <a:t>17-11-14</a:t>
             </a:fld>
             <a:endParaRPr lang="en-US"/>
           </a:p>
@@ -1348,7 +1347,7 @@
           <a:p>
             <a:fld id="{4671B44B-FB70-E747-B8B6-ADB8F11B392A}" type="datetimeFigureOut">
               <a:rPr lang="en-US" smtClean="0"/>
-              <a:t>11-11-14</a:t>
+              <a:t>17-11-14</a:t>
             </a:fld>
             <a:endParaRPr lang="en-US"/>
           </a:p>
@@ -1770,7 +1769,7 @@
           <a:p>
             <a:fld id="{4671B44B-FB70-E747-B8B6-ADB8F11B392A}" type="datetimeFigureOut">
               <a:rPr lang="en-US" smtClean="0"/>
-              <a:t>11-11-14</a:t>
+              <a:t>17-11-14</a:t>
             </a:fld>
             <a:endParaRPr lang="en-US"/>
           </a:p>
@@ -1888,7 +1887,7 @@
           <a:p>
             <a:fld id="{4671B44B-FB70-E747-B8B6-ADB8F11B392A}" type="datetimeFigureOut">
               <a:rPr lang="en-US" smtClean="0"/>
-              <a:t>11-11-14</a:t>
+              <a:t>17-11-14</a:t>
             </a:fld>
             <a:endParaRPr lang="en-US"/>
           </a:p>
@@ -1983,7 +1982,7 @@
           <a:p>
             <a:fld id="{4671B44B-FB70-E747-B8B6-ADB8F11B392A}" type="datetimeFigureOut">
               <a:rPr lang="en-US" smtClean="0"/>
-              <a:t>11-11-14</a:t>
+              <a:t>17-11-14</a:t>
             </a:fld>
             <a:endParaRPr lang="en-US"/>
           </a:p>
@@ -2260,7 +2259,7 @@
           <a:p>
             <a:fld id="{4671B44B-FB70-E747-B8B6-ADB8F11B392A}" type="datetimeFigureOut">
               <a:rPr lang="en-US" smtClean="0"/>
-              <a:t>11-11-14</a:t>
+              <a:t>17-11-14</a:t>
             </a:fld>
             <a:endParaRPr lang="en-US"/>
           </a:p>
@@ -2513,7 +2512,7 @@
           <a:p>
             <a:fld id="{4671B44B-FB70-E747-B8B6-ADB8F11B392A}" type="datetimeFigureOut">
               <a:rPr lang="en-US" smtClean="0"/>
-              <a:t>11-11-14</a:t>
+              <a:t>17-11-14</a:t>
             </a:fld>
             <a:endParaRPr lang="en-US"/>
           </a:p>
@@ -2726,7 +2725,7 @@
           <a:p>
             <a:fld id="{4671B44B-FB70-E747-B8B6-ADB8F11B392A}" type="datetimeFigureOut">
               <a:rPr lang="en-US" smtClean="0"/>
-              <a:t>11-11-14</a:t>
+              <a:t>17-11-14</a:t>
             </a:fld>
             <a:endParaRPr lang="en-US"/>
           </a:p>
@@ -3319,38 +3318,75 @@
           <a:lstStyle/>
           <a:p>
             <a:r>
+              <a:rPr lang="en-US" dirty="0"/>
+              <a:t>G</a:t>
+            </a:r>
+            <a:r>
               <a:rPr lang="en-US" dirty="0" smtClean="0"/>
-              <a:t>Matrix</a:t>
+              <a:t>rid</a:t>
             </a:r>
             <a:endParaRPr lang="en-US" dirty="0"/>
           </a:p>
         </p:txBody>
       </p:sp>
-      <p:pic>
-        <p:nvPicPr>
-          <p:cNvPr id="4" name="Content Placeholder 3" descr="Schermafbeelding 2014-11-11 om 14.10.33.png"/>
-          <p:cNvPicPr>
-            <a:picLocks noGrp="1" noChangeAspect="1"/>
-          </p:cNvPicPr>
+      <p:sp>
+        <p:nvSpPr>
+          <p:cNvPr id="3" name="Content Placeholder 2"/>
+          <p:cNvSpPr>
+            <a:spLocks noGrp="1"/>
+          </p:cNvSpPr>
           <p:nvPr>
             <p:ph idx="1"/>
           </p:nvPr>
-        </p:nvPicPr>
-        <p:blipFill>
-          <a:blip r:embed="rId2">
-            <a:extLst>
-              <a:ext uri="{28A0092B-C50C-407E-A947-70E740481C1C}">
-                <a14:useLocalDpi xmlns:a14="http://schemas.microsoft.com/office/drawing/2010/main" val="0"/>
-              </a:ext>
-            </a:extLst>
-          </a:blip>
-          <a:srcRect t="18950" b="18950"/>
-          <a:stretch>
-            <a:fillRect/>
-          </a:stretch>
-        </p:blipFill>
-        <p:spPr/>
-      </p:pic>
+        </p:nvSpPr>
+        <p:spPr/>
+        <p:txBody>
+          <a:bodyPr/>
+          <a:lstStyle/>
+          <a:p>
+            <a:r>
+              <a:rPr lang="en-US" dirty="0" smtClean="0"/>
+              <a:t>Class Matrix</a:t>
+            </a:r>
+          </a:p>
+          <a:p>
+            <a:pPr lvl="1"/>
+            <a:r>
+              <a:rPr lang="en-US" dirty="0" smtClean="0"/>
+              <a:t>List in lists</a:t>
+            </a:r>
+          </a:p>
+          <a:p>
+            <a:pPr lvl="1"/>
+            <a:endParaRPr lang="en-US" dirty="0"/>
+          </a:p>
+          <a:p>
+            <a:pPr lvl="1"/>
+            <a:r>
+              <a:rPr lang="en-US" dirty="0" smtClean="0"/>
+              <a:t>Default with zeros</a:t>
+            </a:r>
+          </a:p>
+          <a:p>
+            <a:pPr lvl="1"/>
+            <a:r>
+              <a:rPr lang="en-US" dirty="0" smtClean="0"/>
+              <a:t>Logical gates represented with -1</a:t>
+            </a:r>
+          </a:p>
+          <a:p>
+            <a:pPr lvl="1"/>
+            <a:r>
+              <a:rPr lang="en-US" dirty="0" smtClean="0"/>
+              <a:t>Routes represented by their number (e.g. 32)</a:t>
+            </a:r>
+            <a:endParaRPr lang="en-US" dirty="0"/>
+          </a:p>
+          <a:p>
+            <a:endParaRPr lang="en-US" dirty="0" smtClean="0"/>
+          </a:p>
+        </p:txBody>
+      </p:sp>
     </p:spTree>
     <p:extLst>
       <p:ext uri="{BB962C8B-B14F-4D97-AF65-F5344CB8AC3E}">
@@ -3404,62 +3440,57 @@
           </a:p>
         </p:txBody>
       </p:sp>
-      <p:pic>
-        <p:nvPicPr>
-          <p:cNvPr id="6" name="Content Placeholder 5" descr="Schermafbeelding 2014-11-11 om 14.21.10.png"/>
-          <p:cNvPicPr>
-            <a:picLocks noGrp="1" noChangeAspect="1"/>
-          </p:cNvPicPr>
+      <p:sp>
+        <p:nvSpPr>
+          <p:cNvPr id="3" name="Content Placeholder 2"/>
+          <p:cNvSpPr>
+            <a:spLocks noGrp="1"/>
+          </p:cNvSpPr>
           <p:nvPr>
             <p:ph idx="1"/>
           </p:nvPr>
-        </p:nvPicPr>
-        <p:blipFill>
-          <a:blip r:embed="rId2">
-            <a:extLst>
-              <a:ext uri="{28A0092B-C50C-407E-A947-70E740481C1C}">
-                <a14:useLocalDpi xmlns:a14="http://schemas.microsoft.com/office/drawing/2010/main" val="0"/>
-              </a:ext>
-            </a:extLst>
-          </a:blip>
-          <a:srcRect t="19733" b="19733"/>
-          <a:stretch>
-            <a:fillRect/>
-          </a:stretch>
-        </p:blipFill>
-        <p:spPr/>
-      </p:pic>
-      <p:pic>
-        <p:nvPicPr>
-          <p:cNvPr id="7" name="Content Placeholder 3" descr="Schermafbeelding 2014-11-11 om 14.22.14.png"/>
-          <p:cNvPicPr>
-            <a:picLocks noChangeAspect="1"/>
-          </p:cNvPicPr>
-          <p:nvPr/>
-        </p:nvPicPr>
-        <p:blipFill>
-          <a:blip r:embed="rId3">
-            <a:extLst>
-              <a:ext uri="{28A0092B-C50C-407E-A947-70E740481C1C}">
-                <a14:useLocalDpi xmlns:a14="http://schemas.microsoft.com/office/drawing/2010/main" val="0"/>
-              </a:ext>
-            </a:extLst>
-          </a:blip>
-          <a:srcRect t="25189" b="25189"/>
-          <a:stretch>
-            <a:fillRect/>
-          </a:stretch>
-        </p:blipFill>
-        <p:spPr>
-          <a:xfrm>
-            <a:off x="457200" y="1600200"/>
-            <a:ext cx="8229600" cy="4525963"/>
-          </a:xfrm>
-          <a:prstGeom prst="rect">
-            <a:avLst/>
-          </a:prstGeom>
-        </p:spPr>
-      </p:pic>
+        </p:nvSpPr>
+        <p:spPr/>
+        <p:txBody>
+          <a:bodyPr/>
+          <a:lstStyle/>
+          <a:p>
+            <a:r>
+              <a:rPr lang="en-US" dirty="0" smtClean="0"/>
+              <a:t>Class Routes</a:t>
+            </a:r>
+          </a:p>
+          <a:p>
+            <a:pPr lvl="1"/>
+            <a:r>
+              <a:rPr lang="en-US" dirty="0" smtClean="0"/>
+              <a:t>Start and finish coordinate</a:t>
+            </a:r>
+          </a:p>
+          <a:p>
+            <a:pPr lvl="1"/>
+            <a:r>
+              <a:rPr lang="en-US" dirty="0" smtClean="0"/>
+              <a:t>Go left, right, up or down</a:t>
+            </a:r>
+          </a:p>
+          <a:p>
+            <a:pPr lvl="1"/>
+            <a:endParaRPr lang="en-US" dirty="0"/>
+          </a:p>
+          <a:p>
+            <a:pPr lvl="1"/>
+            <a:r>
+              <a:rPr lang="en-US" dirty="0" smtClean="0"/>
+              <a:t>If step collides with gate try another step</a:t>
+            </a:r>
+          </a:p>
+          <a:p>
+            <a:pPr lvl="1"/>
+            <a:endParaRPr lang="en-US" dirty="0"/>
+          </a:p>
+        </p:txBody>
+      </p:sp>
     </p:spTree>
     <p:extLst>
       <p:ext uri="{BB962C8B-B14F-4D97-AF65-F5344CB8AC3E}">
@@ -3507,41 +3538,42 @@
           <a:p>
             <a:r>
               <a:rPr lang="en-US" dirty="0" smtClean="0"/>
-              <a:t>Routes</a:t>
+              <a:t>Layers</a:t>
             </a:r>
             <a:endParaRPr lang="en-US" dirty="0"/>
           </a:p>
         </p:txBody>
       </p:sp>
-      <p:pic>
-        <p:nvPicPr>
-          <p:cNvPr id="6" name="Content Placeholder 5" descr="Schermafbeelding 2014-11-11 om 14.21.10.png"/>
-          <p:cNvPicPr>
-            <a:picLocks noGrp="1" noChangeAspect="1"/>
-          </p:cNvPicPr>
+      <p:sp>
+        <p:nvSpPr>
+          <p:cNvPr id="3" name="Content Placeholder 2"/>
+          <p:cNvSpPr>
+            <a:spLocks noGrp="1"/>
+          </p:cNvSpPr>
           <p:nvPr>
             <p:ph idx="1"/>
           </p:nvPr>
-        </p:nvPicPr>
-        <p:blipFill>
-          <a:blip r:embed="rId2">
-            <a:extLst>
-              <a:ext uri="{28A0092B-C50C-407E-A947-70E740481C1C}">
-                <a14:useLocalDpi xmlns:a14="http://schemas.microsoft.com/office/drawing/2010/main" val="0"/>
-              </a:ext>
-            </a:extLst>
-          </a:blip>
-          <a:srcRect t="19733" b="19733"/>
-          <a:stretch>
-            <a:fillRect/>
-          </a:stretch>
-        </p:blipFill>
-        <p:spPr/>
-      </p:pic>
+        </p:nvSpPr>
+        <p:spPr/>
+        <p:txBody>
+          <a:bodyPr/>
+          <a:lstStyle/>
+          <a:p>
+            <a:r>
+              <a:rPr lang="en-US" dirty="0" smtClean="0"/>
+              <a:t>Class Layers</a:t>
+            </a:r>
+          </a:p>
+          <a:p>
+            <a:pPr lvl="1"/>
+            <a:endParaRPr lang="en-US" dirty="0"/>
+          </a:p>
+        </p:txBody>
+      </p:sp>
     </p:spTree>
     <p:extLst>
       <p:ext uri="{BB962C8B-B14F-4D97-AF65-F5344CB8AC3E}">
-        <p14:creationId xmlns:p14="http://schemas.microsoft.com/office/powerpoint/2010/main" val="3920283164"/>
+        <p14:creationId xmlns:p14="http://schemas.microsoft.com/office/powerpoint/2010/main" val="1927676121"/>
       </p:ext>
     </p:extLst>
   </p:cSld>
@@ -3585,7 +3617,7 @@
           <a:p>
             <a:r>
               <a:rPr lang="en-US" dirty="0" smtClean="0"/>
-              <a:t>Layers</a:t>
+              <a:t>Algorithms?</a:t>
             </a:r>
             <a:endParaRPr lang="en-US" dirty="0"/>
           </a:p>
@@ -3593,7 +3625,7 @@
       </p:sp>
       <p:sp>
         <p:nvSpPr>
-          <p:cNvPr id="3" name="Content Placeholder 2"/>
+          <p:cNvPr id="5" name="Content Placeholder 4"/>
           <p:cNvSpPr>
             <a:spLocks noGrp="1"/>
           </p:cNvSpPr>
@@ -3603,113 +3635,51 @@
         </p:nvSpPr>
         <p:spPr/>
         <p:txBody>
-          <a:bodyPr/>
-          <a:lstStyle/>
-          <a:p>
-            <a:endParaRPr lang="en-US"/>
-          </a:p>
-        </p:txBody>
-      </p:sp>
-      <p:pic>
-        <p:nvPicPr>
-          <p:cNvPr id="4" name="Content Placeholder 3" descr="Schermafbeelding 2014-11-11 om 14.20.43.png"/>
-          <p:cNvPicPr>
-            <a:picLocks noChangeAspect="1"/>
-          </p:cNvPicPr>
-          <p:nvPr/>
-        </p:nvPicPr>
-        <p:blipFill>
-          <a:blip r:embed="rId2">
-            <a:extLst>
-              <a:ext uri="{28A0092B-C50C-407E-A947-70E740481C1C}">
-                <a14:useLocalDpi xmlns:a14="http://schemas.microsoft.com/office/drawing/2010/main" val="0"/>
-              </a:ext>
-            </a:extLst>
-          </a:blip>
-          <a:srcRect t="27105" b="27105"/>
-          <a:stretch>
-            <a:fillRect/>
-          </a:stretch>
-        </p:blipFill>
-        <p:spPr>
-          <a:xfrm>
-            <a:off x="165099" y="1417638"/>
-            <a:ext cx="8876189" cy="4881562"/>
-          </a:xfrm>
-          <a:prstGeom prst="rect">
-            <a:avLst/>
-          </a:prstGeom>
-        </p:spPr>
-      </p:pic>
-    </p:spTree>
-    <p:extLst>
-      <p:ext uri="{BB962C8B-B14F-4D97-AF65-F5344CB8AC3E}">
-        <p14:creationId xmlns:p14="http://schemas.microsoft.com/office/powerpoint/2010/main" val="1927676121"/>
-      </p:ext>
-    </p:extLst>
-  </p:cSld>
-  <p:clrMapOvr>
-    <a:masterClrMapping/>
-  </p:clrMapOvr>
-</p:sld>
-</file>
-
-<file path=ppt/slides/slide7.xml><?xml version="1.0" encoding="utf-8"?>
-<p:sld xmlns:a="http://schemas.openxmlformats.org/drawingml/2006/main" xmlns:r="http://schemas.openxmlformats.org/officeDocument/2006/relationships" xmlns:p="http://schemas.openxmlformats.org/presentationml/2006/main">
-  <p:cSld>
-    <p:spTree>
-      <p:nvGrpSpPr>
-        <p:cNvPr id="1" name=""/>
-        <p:cNvGrpSpPr/>
-        <p:nvPr/>
-      </p:nvGrpSpPr>
-      <p:grpSpPr>
-        <a:xfrm>
-          <a:off x="0" y="0"/>
-          <a:ext cx="0" cy="0"/>
-          <a:chOff x="0" y="0"/>
-          <a:chExt cx="0" cy="0"/>
-        </a:xfrm>
-      </p:grpSpPr>
-      <p:sp>
-        <p:nvSpPr>
-          <p:cNvPr id="2" name="Title 1"/>
-          <p:cNvSpPr>
-            <a:spLocks noGrp="1"/>
-          </p:cNvSpPr>
-          <p:nvPr>
-            <p:ph type="title"/>
-          </p:nvPr>
-        </p:nvSpPr>
-        <p:spPr/>
-        <p:txBody>
-          <a:bodyPr/>
+          <a:bodyPr>
+            <a:normAutofit lnSpcReduction="10000"/>
+          </a:bodyPr>
           <a:lstStyle/>
           <a:p>
             <a:r>
               <a:rPr lang="en-US" dirty="0" smtClean="0"/>
-              <a:t>Algorithms?</a:t>
-            </a:r>
+              <a:t>If route crosses another move it down a layer</a:t>
+            </a:r>
+          </a:p>
+          <a:p>
+            <a:pPr lvl="1"/>
+            <a:r>
+              <a:rPr lang="en-US" dirty="0" smtClean="0"/>
+              <a:t>(best about 13 layers)</a:t>
+            </a:r>
+          </a:p>
+          <a:p>
+            <a:pPr lvl="1"/>
             <a:endParaRPr lang="en-US" dirty="0"/>
           </a:p>
-        </p:txBody>
-      </p:sp>
-      <p:sp>
-        <p:nvSpPr>
-          <p:cNvPr id="5" name="Content Placeholder 4"/>
-          <p:cNvSpPr>
-            <a:spLocks noGrp="1"/>
-          </p:cNvSpPr>
-          <p:nvPr>
-            <p:ph idx="1"/>
-          </p:nvPr>
-        </p:nvSpPr>
-        <p:spPr/>
-        <p:txBody>
-          <a:bodyPr/>
-          <a:lstStyle/>
-          <a:p>
-            <a:endParaRPr lang="en-US"/>
+          <a:p>
+            <a:r>
+              <a:rPr lang="en-US" dirty="0" smtClean="0"/>
+              <a:t>Move down at the cross</a:t>
+            </a:r>
+          </a:p>
+          <a:p>
+            <a:endParaRPr lang="en-US" dirty="0" smtClean="0"/>
+          </a:p>
+          <a:p>
+            <a:r>
+              <a:rPr lang="en-US" dirty="0" smtClean="0"/>
+              <a:t>Move the lines down in quadrants</a:t>
+            </a:r>
+          </a:p>
+          <a:p>
+            <a:endParaRPr lang="en-US" dirty="0"/>
+          </a:p>
+          <a:p>
+            <a:r>
+              <a:rPr lang="en-US" dirty="0" smtClean="0"/>
+              <a:t>More ideas?</a:t>
+            </a:r>
+            <a:endParaRPr lang="en-US" dirty="0" smtClean="0"/>
           </a:p>
         </p:txBody>
       </p:sp>

</xml_diff>

<commit_message>
Alles is nu gecement
</commit_message>
<xml_diff>
--- a/Presentatie chips and circuits.pptx
+++ b/Presentatie chips and circuits.pptx
@@ -116,6 +116,224 @@
     </a:lvl9pPr>
   </p:defaultTextStyle>
 </p:presentation>
+</file>
+
+<file path=ppt/charts/chart1.xml><?xml version="1.0" encoding="utf-8"?>
+<c:chartSpace xmlns:c="http://schemas.openxmlformats.org/drawingml/2006/chart" xmlns:a="http://schemas.openxmlformats.org/drawingml/2006/main" xmlns:r="http://schemas.openxmlformats.org/officeDocument/2006/relationships">
+  <c:date1904 val="0"/>
+  <c:lang val="en-US"/>
+  <c:roundedCorners val="0"/>
+  <mc:AlternateContent xmlns:mc="http://schemas.openxmlformats.org/markup-compatibility/2006">
+    <mc:Choice xmlns:c14="http://schemas.microsoft.com/office/drawing/2007/8/2/chart" Requires="c14">
+      <c14:style val="118"/>
+    </mc:Choice>
+    <mc:Fallback>
+      <c:style val="18"/>
+    </mc:Fallback>
+  </mc:AlternateContent>
+  <c:chart>
+    <c:autoTitleDeleted val="0"/>
+    <c:plotArea>
+      <c:layout/>
+      <c:barChart>
+        <c:barDir val="col"/>
+        <c:grouping val="clustered"/>
+        <c:varyColors val="0"/>
+        <c:ser>
+          <c:idx val="0"/>
+          <c:order val="0"/>
+          <c:tx>
+            <c:strRef>
+              <c:f>Sheet1!$A$2</c:f>
+              <c:strCache>
+                <c:ptCount val="1"/>
+                <c:pt idx="0">
+                  <c:v>Scheme 1</c:v>
+                </c:pt>
+              </c:strCache>
+            </c:strRef>
+          </c:tx>
+          <c:invertIfNegative val="0"/>
+          <c:cat>
+            <c:strRef>
+              <c:f>Sheet1!$B$1:$C$1</c:f>
+              <c:strCache>
+                <c:ptCount val="2"/>
+                <c:pt idx="0">
+                  <c:v>Grid 1</c:v>
+                </c:pt>
+                <c:pt idx="1">
+                  <c:v>Grid 2</c:v>
+                </c:pt>
+              </c:strCache>
+            </c:strRef>
+          </c:cat>
+          <c:val>
+            <c:numRef>
+              <c:f>Sheet1!$B$2:$C$2</c:f>
+              <c:numCache>
+                <c:formatCode>General</c:formatCode>
+                <c:ptCount val="2"/>
+                <c:pt idx="0">
+                  <c:v>587.0</c:v>
+                </c:pt>
+                <c:pt idx="1">
+                  <c:v>1236.0</c:v>
+                </c:pt>
+              </c:numCache>
+            </c:numRef>
+          </c:val>
+        </c:ser>
+        <c:ser>
+          <c:idx val="1"/>
+          <c:order val="1"/>
+          <c:tx>
+            <c:strRef>
+              <c:f>Sheet1!$A$3</c:f>
+              <c:strCache>
+                <c:ptCount val="1"/>
+                <c:pt idx="0">
+                  <c:v>Scheme 2</c:v>
+                </c:pt>
+              </c:strCache>
+            </c:strRef>
+          </c:tx>
+          <c:invertIfNegative val="0"/>
+          <c:cat>
+            <c:strRef>
+              <c:f>Sheet1!$B$1:$C$1</c:f>
+              <c:strCache>
+                <c:ptCount val="2"/>
+                <c:pt idx="0">
+                  <c:v>Grid 1</c:v>
+                </c:pt>
+                <c:pt idx="1">
+                  <c:v>Grid 2</c:v>
+                </c:pt>
+              </c:strCache>
+            </c:strRef>
+          </c:cat>
+          <c:val>
+            <c:numRef>
+              <c:f>Sheet1!$B$3:$C$3</c:f>
+              <c:numCache>
+                <c:formatCode>General</c:formatCode>
+                <c:ptCount val="2"/>
+                <c:pt idx="0">
+                  <c:v>657.0</c:v>
+                </c:pt>
+                <c:pt idx="1">
+                  <c:v>1350.0</c:v>
+                </c:pt>
+              </c:numCache>
+            </c:numRef>
+          </c:val>
+        </c:ser>
+        <c:ser>
+          <c:idx val="2"/>
+          <c:order val="2"/>
+          <c:tx>
+            <c:strRef>
+              <c:f>Sheet1!$A$4</c:f>
+              <c:strCache>
+                <c:ptCount val="1"/>
+                <c:pt idx="0">
+                  <c:v>Scheme 3</c:v>
+                </c:pt>
+              </c:strCache>
+            </c:strRef>
+          </c:tx>
+          <c:invertIfNegative val="0"/>
+          <c:cat>
+            <c:strRef>
+              <c:f>Sheet1!$B$1:$C$1</c:f>
+              <c:strCache>
+                <c:ptCount val="2"/>
+                <c:pt idx="0">
+                  <c:v>Grid 1</c:v>
+                </c:pt>
+                <c:pt idx="1">
+                  <c:v>Grid 2</c:v>
+                </c:pt>
+              </c:strCache>
+            </c:strRef>
+          </c:cat>
+          <c:val>
+            <c:numRef>
+              <c:f>Sheet1!$B$4:$C$4</c:f>
+              <c:numCache>
+                <c:formatCode>General</c:formatCode>
+                <c:ptCount val="2"/>
+                <c:pt idx="0">
+                  <c:v>1019.0</c:v>
+                </c:pt>
+                <c:pt idx="1">
+                  <c:v>1955.0</c:v>
+                </c:pt>
+              </c:numCache>
+            </c:numRef>
+          </c:val>
+        </c:ser>
+        <c:dLbls>
+          <c:showLegendKey val="0"/>
+          <c:showVal val="0"/>
+          <c:showCatName val="0"/>
+          <c:showSerName val="0"/>
+          <c:showPercent val="0"/>
+          <c:showBubbleSize val="0"/>
+        </c:dLbls>
+        <c:gapWidth val="150"/>
+        <c:axId val="2085300824"/>
+        <c:axId val="2085490136"/>
+      </c:barChart>
+      <c:catAx>
+        <c:axId val="2085300824"/>
+        <c:scaling>
+          <c:orientation val="minMax"/>
+        </c:scaling>
+        <c:delete val="0"/>
+        <c:axPos val="b"/>
+        <c:numFmt formatCode="General" sourceLinked="1"/>
+        <c:majorTickMark val="out"/>
+        <c:minorTickMark val="none"/>
+        <c:tickLblPos val="nextTo"/>
+        <c:crossAx val="2085490136"/>
+        <c:crosses val="autoZero"/>
+        <c:auto val="1"/>
+        <c:lblAlgn val="ctr"/>
+        <c:lblOffset val="100"/>
+        <c:noMultiLvlLbl val="0"/>
+      </c:catAx>
+      <c:valAx>
+        <c:axId val="2085490136"/>
+        <c:scaling>
+          <c:orientation val="minMax"/>
+        </c:scaling>
+        <c:delete val="0"/>
+        <c:axPos val="l"/>
+        <c:majorGridlines/>
+        <c:numFmt formatCode="General" sourceLinked="1"/>
+        <c:majorTickMark val="out"/>
+        <c:minorTickMark val="none"/>
+        <c:tickLblPos val="nextTo"/>
+        <c:crossAx val="2085300824"/>
+        <c:crosses val="autoZero"/>
+        <c:crossBetween val="between"/>
+      </c:valAx>
+    </c:plotArea>
+    <c:legend>
+      <c:legendPos val="r"/>
+      <c:layout/>
+      <c:overlay val="0"/>
+    </c:legend>
+    <c:plotVisOnly val="1"/>
+    <c:dispBlanksAs val="gap"/>
+    <c:showDLblsOverMax val="0"/>
+  </c:chart>
+  <c:externalData r:id="rId1">
+    <c:autoUpdate val="0"/>
+  </c:externalData>
+</c:chartSpace>
 </file>
 
 <file path=ppt/slideLayouts/slideLayout1.xml><?xml version="1.0" encoding="utf-8"?>
@@ -7659,124 +7877,30 @@
           </a:p>
         </p:txBody>
       </p:sp>
-      <p:sp>
-        <p:nvSpPr>
-          <p:cNvPr id="3" name="Content Placeholder 2"/>
-          <p:cNvSpPr>
-            <a:spLocks noGrp="1"/>
-          </p:cNvSpPr>
-          <p:nvPr>
-            <p:ph idx="1"/>
-          </p:nvPr>
-        </p:nvSpPr>
-        <p:spPr/>
-        <p:txBody>
-          <a:bodyPr>
-            <a:normAutofit lnSpcReduction="10000"/>
-          </a:bodyPr>
-          <a:lstStyle/>
-          <a:p>
-            <a:r>
-              <a:rPr lang="en-US" dirty="0"/>
-              <a:t>Grid </a:t>
-            </a:r>
-            <a:r>
-              <a:rPr lang="en-US" dirty="0" smtClean="0"/>
-              <a:t>2</a:t>
-            </a:r>
-          </a:p>
-          <a:p>
-            <a:pPr lvl="1"/>
-            <a:r>
-              <a:rPr lang="en-US" dirty="0" smtClean="0"/>
-              <a:t>Net list 1 (lines = 50)</a:t>
-            </a:r>
-            <a:endParaRPr lang="en-US" dirty="0"/>
-          </a:p>
-          <a:p>
-            <a:pPr lvl="2"/>
-            <a:r>
-              <a:rPr lang="en-US" dirty="0"/>
-              <a:t>A</a:t>
-            </a:r>
-            <a:r>
-              <a:rPr lang="en-US" dirty="0" smtClean="0"/>
-              <a:t>* - 8 layers, 1236 wires</a:t>
-            </a:r>
-            <a:endParaRPr lang="en-US" dirty="0"/>
-          </a:p>
-          <a:p>
-            <a:pPr lvl="2"/>
-            <a:r>
-              <a:rPr lang="en-US" dirty="0" smtClean="0"/>
-              <a:t>Other - </a:t>
-            </a:r>
-            <a:endParaRPr lang="en-US" dirty="0"/>
-          </a:p>
-          <a:p>
-            <a:pPr lvl="1"/>
-            <a:r>
-              <a:rPr lang="en-US" dirty="0" smtClean="0"/>
-              <a:t>Net list 2 (lines = 60)</a:t>
-            </a:r>
-            <a:endParaRPr lang="en-US" dirty="0"/>
-          </a:p>
-          <a:p>
-            <a:pPr lvl="2"/>
-            <a:r>
-              <a:rPr lang="en-US" dirty="0"/>
-              <a:t>A</a:t>
-            </a:r>
-            <a:r>
-              <a:rPr lang="en-US" dirty="0" smtClean="0"/>
-              <a:t>* - 8 layers, 1350 wires</a:t>
-            </a:r>
-            <a:endParaRPr lang="en-US" dirty="0"/>
-          </a:p>
-          <a:p>
-            <a:pPr lvl="2"/>
-            <a:r>
-              <a:rPr lang="en-US" dirty="0" smtClean="0"/>
-              <a:t>Other - </a:t>
-            </a:r>
-            <a:endParaRPr lang="en-US" dirty="0"/>
-          </a:p>
-          <a:p>
-            <a:pPr lvl="1"/>
-            <a:r>
-              <a:rPr lang="en-US" dirty="0" smtClean="0"/>
-              <a:t>Net list 3 (lines = 70)</a:t>
-            </a:r>
-            <a:endParaRPr lang="en-US" dirty="0"/>
-          </a:p>
-          <a:p>
-            <a:pPr lvl="2"/>
-            <a:r>
-              <a:rPr lang="en-US" dirty="0"/>
-              <a:t>A</a:t>
-            </a:r>
-            <a:r>
-              <a:rPr lang="en-US" dirty="0" smtClean="0"/>
-              <a:t>* - 8 layers, </a:t>
-            </a:r>
-            <a:endParaRPr lang="en-US" dirty="0"/>
-          </a:p>
-          <a:p>
-            <a:pPr lvl="2"/>
-            <a:r>
-              <a:rPr lang="en-US" dirty="0" smtClean="0"/>
-              <a:t>Other - </a:t>
-            </a:r>
-            <a:endParaRPr lang="en-US" dirty="0"/>
-          </a:p>
-          <a:p>
-            <a:endParaRPr lang="en-US" dirty="0"/>
-          </a:p>
-          <a:p>
-            <a:endParaRPr lang="en-US" dirty="0"/>
-          </a:p>
-        </p:txBody>
-      </p:sp>
+      <p:graphicFrame>
+        <p:nvGraphicFramePr>
+          <p:cNvPr id="5" name="Chart 4"/>
+          <p:cNvGraphicFramePr>
+            <a:graphicFrameLocks/>
+          </p:cNvGraphicFramePr>
+          <p:nvPr>
+            <p:extLst>
+              <p:ext uri="{D42A27DB-BD31-4B8C-83A1-F6EECF244321}">
+                <p14:modId xmlns:p14="http://schemas.microsoft.com/office/powerpoint/2010/main" val="3704910542"/>
+              </p:ext>
+            </p:extLst>
+          </p:nvPr>
+        </p:nvGraphicFramePr>
+        <p:xfrm>
+          <a:off x="900113" y="1803400"/>
+          <a:ext cx="7345362" cy="4330700"/>
+        </p:xfrm>
+        <a:graphic>
+          <a:graphicData uri="http://schemas.openxmlformats.org/drawingml/2006/chart">
+            <c:chart xmlns:c="http://schemas.openxmlformats.org/drawingml/2006/chart" xmlns:r="http://schemas.openxmlformats.org/officeDocument/2006/relationships" r:id="rId2"/>
+          </a:graphicData>
+        </a:graphic>
+      </p:graphicFrame>
     </p:spTree>
     <p:extLst>
       <p:ext uri="{BB962C8B-B14F-4D97-AF65-F5344CB8AC3E}">
@@ -8054,11 +8178,7 @@
           <a:p>
             <a:r>
               <a:rPr lang="en-US" dirty="0" smtClean="0"/>
-              <a:t>Create routes/</a:t>
-            </a:r>
-            <a:r>
-              <a:rPr lang="en-US" dirty="0" smtClean="0"/>
-              <a:t>layers</a:t>
+              <a:t>Create routes/layers</a:t>
             </a:r>
           </a:p>
           <a:p>
@@ -8071,7 +8191,6 @@
               <a:rPr lang="en-US" dirty="0" smtClean="0"/>
               <a:t>aximum 8 layers</a:t>
             </a:r>
-            <a:endParaRPr lang="en-US" dirty="0" smtClean="0"/>
           </a:p>
           <a:p>
             <a:r>
@@ -8087,11 +8206,7 @@
             </a:r>
             <a:r>
               <a:rPr lang="en-US" dirty="0" smtClean="0"/>
-              <a:t>total of wires </a:t>
-            </a:r>
-            <a:r>
-              <a:rPr lang="en-US" dirty="0" smtClean="0"/>
-              <a:t>desirable</a:t>
+              <a:t>total of wires desirable</a:t>
             </a:r>
           </a:p>
           <a:p>
@@ -8213,7 +8328,6 @@
               <a:rPr lang="en-US" dirty="0" smtClean="0"/>
               <a:t>Net list (a -&gt; b, c -&gt; d, b -&gt; c)</a:t>
             </a:r>
-            <a:endParaRPr lang="en-US" dirty="0" smtClean="0"/>
           </a:p>
           <a:p>
             <a:pPr lvl="1"/>
@@ -8229,11 +8343,7 @@
             <a:pPr lvl="1"/>
             <a:r>
               <a:rPr lang="en-US" dirty="0" smtClean="0"/>
-              <a:t>Layers with </a:t>
-            </a:r>
-            <a:r>
-              <a:rPr lang="en-US" dirty="0" smtClean="0"/>
-              <a:t>routes</a:t>
+              <a:t>Layers with routes</a:t>
             </a:r>
           </a:p>
           <a:p>
@@ -8242,7 +8352,6 @@
               <a:rPr lang="en-US" dirty="0" smtClean="0"/>
               <a:t>Amount of wires</a:t>
             </a:r>
-            <a:endParaRPr lang="en-US" dirty="0" smtClean="0"/>
           </a:p>
           <a:p>
             <a:pPr lvl="1"/>
@@ -8549,7 +8658,6 @@
               <a:rPr lang="en-US" dirty="0" smtClean="0"/>
               <a:t>A*</a:t>
             </a:r>
-            <a:endParaRPr lang="en-US" dirty="0" smtClean="0"/>
           </a:p>
         </p:txBody>
       </p:sp>

</xml_diff>